<commit_message>
Milestone Presentation updated structure
</commit_message>
<xml_diff>
--- a/docs/Dear Diary - Milestone I Presentation.pptx
+++ b/docs/Dear Diary - Milestone I Presentation.pptx
@@ -679,7 +679,7 @@
           <a:p>
             <a:fld id="{43360104-F800-4E31-B753-9F884E127649}" type="datetimeFigureOut">
               <a:rPr lang="de-AT" smtClean="0"/>
-              <a:t>30.09.2022</a:t>
+              <a:t>03.10.2022</a:t>
             </a:fld>
             <a:endParaRPr lang="de-AT"/>
           </a:p>
@@ -1277,7 +1277,7 @@
           <a:p>
             <a:fld id="{43360104-F800-4E31-B753-9F884E127649}" type="datetimeFigureOut">
               <a:rPr lang="de-AT" smtClean="0"/>
-              <a:t>30.09.2022</a:t>
+              <a:t>03.10.2022</a:t>
             </a:fld>
             <a:endParaRPr lang="de-AT"/>
           </a:p>
@@ -1538,7 +1538,7 @@
           <a:p>
             <a:fld id="{43360104-F800-4E31-B753-9F884E127649}" type="datetimeFigureOut">
               <a:rPr lang="de-AT" smtClean="0"/>
-              <a:t>30.09.2022</a:t>
+              <a:t>03.10.2022</a:t>
             </a:fld>
             <a:endParaRPr lang="de-AT"/>
           </a:p>
@@ -1752,7 +1752,7 @@
           <a:p>
             <a:fld id="{43360104-F800-4E31-B753-9F884E127649}" type="datetimeFigureOut">
               <a:rPr lang="de-AT" smtClean="0"/>
-              <a:t>30.09.2022</a:t>
+              <a:t>03.10.2022</a:t>
             </a:fld>
             <a:endParaRPr lang="de-AT"/>
           </a:p>
@@ -1897,7 +1897,7 @@
           <a:p>
             <a:fld id="{43360104-F800-4E31-B753-9F884E127649}" type="datetimeFigureOut">
               <a:rPr lang="de-AT" smtClean="0"/>
-              <a:t>30.09.2022</a:t>
+              <a:t>03.10.2022</a:t>
             </a:fld>
             <a:endParaRPr lang="de-AT"/>
           </a:p>
@@ -2270,7 +2270,7 @@
           <a:p>
             <a:fld id="{43360104-F800-4E31-B753-9F884E127649}" type="datetimeFigureOut">
               <a:rPr lang="de-AT" smtClean="0"/>
-              <a:t>30.09.2022</a:t>
+              <a:t>03.10.2022</a:t>
             </a:fld>
             <a:endParaRPr lang="de-AT"/>
           </a:p>
@@ -2595,7 +2595,7 @@
           <a:p>
             <a:fld id="{43360104-F800-4E31-B753-9F884E127649}" type="datetimeFigureOut">
               <a:rPr lang="de-AT" smtClean="0"/>
-              <a:t>30.09.2022</a:t>
+              <a:t>03.10.2022</a:t>
             </a:fld>
             <a:endParaRPr lang="de-AT"/>
           </a:p>
@@ -2845,7 +2845,7 @@
           <a:p>
             <a:fld id="{43360104-F800-4E31-B753-9F884E127649}" type="datetimeFigureOut">
               <a:rPr lang="de-AT" smtClean="0"/>
-              <a:t>30.09.2022</a:t>
+              <a:t>03.10.2022</a:t>
             </a:fld>
             <a:endParaRPr lang="de-AT"/>
           </a:p>
@@ -3391,7 +3391,7 @@
           <a:p>
             <a:fld id="{43360104-F800-4E31-B753-9F884E127649}" type="datetimeFigureOut">
               <a:rPr lang="de-AT" smtClean="0"/>
-              <a:t>30.09.2022</a:t>
+              <a:t>03.10.2022</a:t>
             </a:fld>
             <a:endParaRPr lang="de-AT"/>
           </a:p>
@@ -3841,7 +3841,7 @@
           <a:p>
             <a:fld id="{43360104-F800-4E31-B753-9F884E127649}" type="datetimeFigureOut">
               <a:rPr lang="de-AT" smtClean="0"/>
-              <a:t>30.09.2022</a:t>
+              <a:t>03.10.2022</a:t>
             </a:fld>
             <a:endParaRPr lang="de-AT"/>
           </a:p>
@@ -4015,7 +4015,7 @@
           <a:p>
             <a:fld id="{43360104-F800-4E31-B753-9F884E127649}" type="datetimeFigureOut">
               <a:rPr lang="de-AT" smtClean="0"/>
-              <a:t>30.09.2022</a:t>
+              <a:t>03.10.2022</a:t>
             </a:fld>
             <a:endParaRPr lang="de-AT"/>
           </a:p>
@@ -4496,7 +4496,7 @@
           <a:p>
             <a:fld id="{43360104-F800-4E31-B753-9F884E127649}" type="datetimeFigureOut">
               <a:rPr lang="de-AT" smtClean="0"/>
-              <a:t>30.09.2022</a:t>
+              <a:t>03.10.2022</a:t>
             </a:fld>
             <a:endParaRPr lang="de-AT"/>
           </a:p>
@@ -4800,7 +4800,7 @@
           <a:p>
             <a:fld id="{43360104-F800-4E31-B753-9F884E127649}" type="datetimeFigureOut">
               <a:rPr lang="de-AT" smtClean="0"/>
-              <a:t>30.09.2022</a:t>
+              <a:t>03.10.2022</a:t>
             </a:fld>
             <a:endParaRPr lang="de-AT"/>
           </a:p>
@@ -5281,7 +5281,7 @@
           <a:p>
             <a:fld id="{43360104-F800-4E31-B753-9F884E127649}" type="datetimeFigureOut">
               <a:rPr lang="de-AT" smtClean="0"/>
-              <a:t>30.09.2022</a:t>
+              <a:t>03.10.2022</a:t>
             </a:fld>
             <a:endParaRPr lang="de-AT"/>
           </a:p>
@@ -5536,7 +5536,7 @@
           <a:p>
             <a:fld id="{43360104-F800-4E31-B753-9F884E127649}" type="datetimeFigureOut">
               <a:rPr lang="de-AT" smtClean="0"/>
-              <a:t>30.09.2022</a:t>
+              <a:t>03.10.2022</a:t>
             </a:fld>
             <a:endParaRPr lang="de-AT"/>
           </a:p>
@@ -7128,34 +7128,6 @@
       </p:sp>
       <p:pic>
         <p:nvPicPr>
-          <p:cNvPr id="18" name="Inhaltsplatzhalter 17">
-            <a:extLst>
-              <a:ext uri="{FF2B5EF4-FFF2-40B4-BE49-F238E27FC236}">
-                <a16:creationId xmlns:a16="http://schemas.microsoft.com/office/drawing/2014/main" id="{2F6BF837-03FE-2C2A-4992-DF59C1092FAE}"/>
-              </a:ext>
-            </a:extLst>
-          </p:cNvPr>
-          <p:cNvPicPr>
-            <a:picLocks noGrp="1" noChangeAspect="1"/>
-          </p:cNvPicPr>
-          <p:nvPr>
-            <p:ph idx="1"/>
-          </p:nvPr>
-        </p:nvPicPr>
-        <p:blipFill rotWithShape="1">
-          <a:blip r:embed="rId3"/>
-          <a:srcRect r="12579"/>
-          <a:stretch/>
-        </p:blipFill>
-        <p:spPr>
-          <a:xfrm>
-            <a:off x="838199" y="1690688"/>
-            <a:ext cx="4847493" cy="4455736"/>
-          </a:xfrm>
-        </p:spPr>
-      </p:pic>
-      <p:pic>
-        <p:nvPicPr>
           <p:cNvPr id="20" name="Grafik 19">
             <a:extLst>
               <a:ext uri="{FF2B5EF4-FFF2-40B4-BE49-F238E27FC236}">
@@ -7169,15 +7141,15 @@
           <p:nvPr/>
         </p:nvPicPr>
         <p:blipFill>
-          <a:blip r:embed="rId4"/>
+          <a:blip r:embed="rId3"/>
           <a:stretch>
             <a:fillRect/>
           </a:stretch>
         </p:blipFill>
         <p:spPr>
           <a:xfrm>
-            <a:off x="5764801" y="2269582"/>
-            <a:ext cx="5588999" cy="3627476"/>
+            <a:off x="5739392" y="2213764"/>
+            <a:ext cx="5132735" cy="3331343"/>
           </a:xfrm>
           <a:prstGeom prst="rect">
             <a:avLst/>
@@ -7230,6 +7202,36 @@
           </a:fontRef>
         </p:style>
       </p:cxnSp>
+      <p:pic>
+        <p:nvPicPr>
+          <p:cNvPr id="6" name="Grafik 5">
+            <a:extLst>
+              <a:ext uri="{FF2B5EF4-FFF2-40B4-BE49-F238E27FC236}">
+                <a16:creationId xmlns:a16="http://schemas.microsoft.com/office/drawing/2014/main" id="{220C099D-A13A-4222-187E-43FCF2DC4B29}"/>
+              </a:ext>
+            </a:extLst>
+          </p:cNvPr>
+          <p:cNvPicPr>
+            <a:picLocks noChangeAspect="1"/>
+          </p:cNvPicPr>
+          <p:nvPr/>
+        </p:nvPicPr>
+        <p:blipFill>
+          <a:blip r:embed="rId4"/>
+          <a:stretch>
+            <a:fillRect/>
+          </a:stretch>
+        </p:blipFill>
+        <p:spPr>
+          <a:xfrm>
+            <a:off x="584298" y="1690688"/>
+            <a:ext cx="5132738" cy="4947854"/>
+          </a:xfrm>
+          <a:prstGeom prst="rect">
+            <a:avLst/>
+          </a:prstGeom>
+        </p:spPr>
+      </p:pic>
     </p:spTree>
     <p:extLst>
       <p:ext uri="{BB962C8B-B14F-4D97-AF65-F5344CB8AC3E}">

</xml_diff>